<commit_message>
スライド5枚目修正 cycle 8 -> cycle [8]
</commit_message>
<xml_diff>
--- a/201311/LYaHfGG2.pptx
+++ b/201311/LYaHfGG2.pptx
@@ -8256,11 +8256,7 @@
           <a:p>
             <a:r>
               <a:rPr lang="ja-JP" altLang="en-US" dirty="0" smtClean="0"/>
-              <a:t>次回をお楽しみに！</a:t>
-            </a:r>
-            <a:r>
-              <a:rPr lang="ja-JP" altLang="en-US" dirty="0" smtClean="0"/>
-              <a:t>！</a:t>
+              <a:t>次回をお楽しみに！！</a:t>
             </a:r>
             <a:endParaRPr lang="en-US" altLang="ja-JP" dirty="0" smtClean="0"/>
           </a:p>
@@ -8507,11 +8503,7 @@
           <a:p>
             <a:r>
               <a:rPr lang="ja-JP" altLang="en-US" dirty="0" smtClean="0"/>
-              <a:t>練習</a:t>
-            </a:r>
-            <a:r>
-              <a:rPr lang="ja-JP" altLang="en-US" dirty="0" smtClean="0"/>
-              <a:t>問題①</a:t>
+              <a:t>練習問題①</a:t>
             </a:r>
             <a:endParaRPr kumimoji="1" lang="ja-JP" altLang="en-US" dirty="0"/>
           </a:p>
@@ -8987,10 +8979,14 @@
             </a:r>
             <a:r>
               <a:rPr lang="en-US" altLang="ja-JP" dirty="0" smtClean="0"/>
-              <a:t>cycle 8</a:t>
-            </a:r>
-            <a:r>
-              <a:rPr lang="ja-JP" altLang="en-US" dirty="0" smtClean="0"/>
+              <a:t>cycle </a:t>
+            </a:r>
+            <a:r>
+              <a:rPr lang="en-US" altLang="ja-JP" smtClean="0"/>
+              <a:t>[8]</a:t>
+            </a:r>
+            <a:r>
+              <a:rPr lang="ja-JP" altLang="en-US" smtClean="0"/>
               <a:t>）</a:t>
             </a:r>
             <a:r>
@@ -9045,35 +9041,7 @@
             </a:r>
             <a:r>
               <a:rPr lang="en-US" altLang="ja-JP" dirty="0" smtClean="0"/>
-              <a:t> -&gt; </a:t>
-            </a:r>
-            <a:r>
-              <a:rPr lang="en-US" altLang="ja-JP" dirty="0" smtClean="0"/>
-              <a:t>a</a:t>
-            </a:r>
-            <a:r>
-              <a:rPr lang="en-US" altLang="ja-JP" dirty="0" smtClean="0"/>
-              <a:t> </a:t>
-            </a:r>
-            <a:r>
-              <a:rPr lang="en-US" altLang="ja-JP" dirty="0" smtClean="0"/>
-              <a:t>-&gt; </a:t>
-            </a:r>
-            <a:r>
-              <a:rPr lang="en-US" altLang="ja-JP" dirty="0" smtClean="0"/>
-              <a:t>[</a:t>
-            </a:r>
-            <a:r>
-              <a:rPr lang="en-US" altLang="ja-JP" dirty="0" smtClean="0"/>
-              <a:t>a</a:t>
-            </a:r>
-            <a:r>
-              <a:rPr lang="en-US" altLang="ja-JP" dirty="0" smtClean="0"/>
-              <a:t>]</a:t>
-            </a:r>
-            <a:r>
-              <a:rPr lang="en-US" altLang="ja-JP" dirty="0" smtClean="0"/>
-              <a:t/>
+              <a:t> -&gt; a -&gt; [a]</a:t>
             </a:r>
             <a:br>
               <a:rPr lang="en-US" altLang="ja-JP" dirty="0" smtClean="0"/>
@@ -9511,11 +9479,7 @@
             </a:r>
             <a:r>
               <a:rPr lang="en-US" altLang="ja-JP" dirty="0" smtClean="0"/>
-              <a:t> :: [Char] -&gt; [Char</a:t>
-            </a:r>
-            <a:r>
-              <a:rPr lang="en-US" altLang="ja-JP" dirty="0" smtClean="0"/>
-              <a:t>]</a:t>
+              <a:t> :: [Char] -&gt; [Char]</a:t>
             </a:r>
             <a:br>
               <a:rPr lang="en-US" altLang="ja-JP" dirty="0" smtClean="0"/>
@@ -9532,11 +9496,7 @@
           <a:p>
             <a:r>
               <a:rPr lang="ja-JP" altLang="en-US" dirty="0" smtClean="0"/>
-              <a:t>ちなみ</a:t>
-            </a:r>
-            <a:r>
-              <a:rPr lang="ja-JP" altLang="en-US" dirty="0" smtClean="0"/>
-              <a:t>に、</a:t>
+              <a:t>ちなみに、</a:t>
             </a:r>
             <a:r>
               <a:rPr lang="en-US" altLang="ja-JP" dirty="0" smtClean="0"/>
@@ -9562,11 +9522,7 @@
             </a:br>
             <a:r>
               <a:rPr lang="ja-JP" altLang="en-US" dirty="0" smtClean="0"/>
-              <a:t>で</a:t>
-            </a:r>
-            <a:r>
-              <a:rPr lang="ja-JP" altLang="en-US" dirty="0" smtClean="0"/>
-              <a:t>も</a:t>
+              <a:t>でも</a:t>
             </a:r>
             <a:r>
               <a:rPr lang="en-US" altLang="ja-JP" dirty="0" smtClean="0"/>

</xml_diff>